<commit_message>
many bug fixes, placed distance2splits in correct package
</commit_message>
<xml_diff>
--- a/artwork/SplitsTree6-icon.pptx
+++ b/artwork/SplitsTree6-icon.pptx
@@ -6,8 +6,9 @@
   </p:sldMasterIdLst>
   <p:sldIdLst>
     <p:sldId id="256" r:id="rId2"/>
-    <p:sldId id="257" r:id="rId3"/>
-    <p:sldId id="258" r:id="rId4"/>
+    <p:sldId id="259" r:id="rId3"/>
+    <p:sldId id="257" r:id="rId4"/>
+    <p:sldId id="258" r:id="rId5"/>
   </p:sldIdLst>
   <p:sldSz cx="9144000" cy="6858000" type="screen4x3"/>
   <p:notesSz cx="6858000" cy="9144000"/>
@@ -304,7 +305,7 @@
           <a:p>
             <a:fld id="{1C8BF6C4-08AF-5841-8054-716EACEF0073}" type="datetimeFigureOut">
               <a:rPr lang="en-US" smtClean="0"/>
-              <a:t>10/12/21</a:t>
+              <a:t>5/6/22</a:t>
             </a:fld>
             <a:endParaRPr lang="en-US"/>
           </a:p>
@@ -472,7 +473,7 @@
           <a:p>
             <a:fld id="{1C8BF6C4-08AF-5841-8054-716EACEF0073}" type="datetimeFigureOut">
               <a:rPr lang="en-US" smtClean="0"/>
-              <a:t>10/12/21</a:t>
+              <a:t>5/6/22</a:t>
             </a:fld>
             <a:endParaRPr lang="en-US"/>
           </a:p>
@@ -650,7 +651,7 @@
           <a:p>
             <a:fld id="{1C8BF6C4-08AF-5841-8054-716EACEF0073}" type="datetimeFigureOut">
               <a:rPr lang="en-US" smtClean="0"/>
-              <a:t>10/12/21</a:t>
+              <a:t>5/6/22</a:t>
             </a:fld>
             <a:endParaRPr lang="en-US"/>
           </a:p>
@@ -818,7 +819,7 @@
           <a:p>
             <a:fld id="{1C8BF6C4-08AF-5841-8054-716EACEF0073}" type="datetimeFigureOut">
               <a:rPr lang="en-US" smtClean="0"/>
-              <a:t>10/12/21</a:t>
+              <a:t>5/6/22</a:t>
             </a:fld>
             <a:endParaRPr lang="en-US"/>
           </a:p>
@@ -1063,7 +1064,7 @@
           <a:p>
             <a:fld id="{1C8BF6C4-08AF-5841-8054-716EACEF0073}" type="datetimeFigureOut">
               <a:rPr lang="en-US" smtClean="0"/>
-              <a:t>10/12/21</a:t>
+              <a:t>5/6/22</a:t>
             </a:fld>
             <a:endParaRPr lang="en-US"/>
           </a:p>
@@ -1348,7 +1349,7 @@
           <a:p>
             <a:fld id="{1C8BF6C4-08AF-5841-8054-716EACEF0073}" type="datetimeFigureOut">
               <a:rPr lang="en-US" smtClean="0"/>
-              <a:t>10/12/21</a:t>
+              <a:t>5/6/22</a:t>
             </a:fld>
             <a:endParaRPr lang="en-US"/>
           </a:p>
@@ -1767,7 +1768,7 @@
           <a:p>
             <a:fld id="{1C8BF6C4-08AF-5841-8054-716EACEF0073}" type="datetimeFigureOut">
               <a:rPr lang="en-US" smtClean="0"/>
-              <a:t>10/12/21</a:t>
+              <a:t>5/6/22</a:t>
             </a:fld>
             <a:endParaRPr lang="en-US"/>
           </a:p>
@@ -1884,7 +1885,7 @@
           <a:p>
             <a:fld id="{1C8BF6C4-08AF-5841-8054-716EACEF0073}" type="datetimeFigureOut">
               <a:rPr lang="en-US" smtClean="0"/>
-              <a:t>10/12/21</a:t>
+              <a:t>5/6/22</a:t>
             </a:fld>
             <a:endParaRPr lang="en-US"/>
           </a:p>
@@ -1979,7 +1980,7 @@
           <a:p>
             <a:fld id="{1C8BF6C4-08AF-5841-8054-716EACEF0073}" type="datetimeFigureOut">
               <a:rPr lang="en-US" smtClean="0"/>
-              <a:t>10/12/21</a:t>
+              <a:t>5/6/22</a:t>
             </a:fld>
             <a:endParaRPr lang="en-US"/>
           </a:p>
@@ -2254,7 +2255,7 @@
           <a:p>
             <a:fld id="{1C8BF6C4-08AF-5841-8054-716EACEF0073}" type="datetimeFigureOut">
               <a:rPr lang="en-US" smtClean="0"/>
-              <a:t>10/12/21</a:t>
+              <a:t>5/6/22</a:t>
             </a:fld>
             <a:endParaRPr lang="en-US"/>
           </a:p>
@@ -2506,7 +2507,7 @@
           <a:p>
             <a:fld id="{1C8BF6C4-08AF-5841-8054-716EACEF0073}" type="datetimeFigureOut">
               <a:rPr lang="en-US" smtClean="0"/>
-              <a:t>10/12/21</a:t>
+              <a:t>5/6/22</a:t>
             </a:fld>
             <a:endParaRPr lang="en-US"/>
           </a:p>
@@ -2717,7 +2718,7 @@
           <a:p>
             <a:fld id="{1C8BF6C4-08AF-5841-8054-716EACEF0073}" type="datetimeFigureOut">
               <a:rPr lang="en-US" smtClean="0"/>
-              <a:t>10/12/21</a:t>
+              <a:t>5/6/22</a:t>
             </a:fld>
             <a:endParaRPr lang="en-US"/>
           </a:p>
@@ -4054,6 +4055,993 @@
           <a:chExt cx="0" cy="0"/>
         </a:xfrm>
       </p:grpSpPr>
+      <p:sp>
+        <p:nvSpPr>
+          <p:cNvPr id="2" name="Rectangle 1">
+            <a:extLst>
+              <a:ext uri="{FF2B5EF4-FFF2-40B4-BE49-F238E27FC236}">
+                <a16:creationId xmlns:a16="http://schemas.microsoft.com/office/drawing/2014/main" id="{432AED04-51DD-9111-16C0-8D836CBBFD9B}"/>
+              </a:ext>
+            </a:extLst>
+          </p:cNvPr>
+          <p:cNvSpPr/>
+          <p:nvPr/>
+        </p:nvSpPr>
+        <p:spPr>
+          <a:xfrm>
+            <a:off x="922638" y="477795"/>
+            <a:ext cx="7587048" cy="5939481"/>
+          </a:xfrm>
+          <a:prstGeom prst="rect">
+            <a:avLst/>
+          </a:prstGeom>
+        </p:spPr>
+        <p:style>
+          <a:lnRef idx="1">
+            <a:schemeClr val="accent1"/>
+          </a:lnRef>
+          <a:fillRef idx="3">
+            <a:schemeClr val="accent1"/>
+          </a:fillRef>
+          <a:effectRef idx="2">
+            <a:schemeClr val="accent1"/>
+          </a:effectRef>
+          <a:fontRef idx="minor">
+            <a:schemeClr val="lt1"/>
+          </a:fontRef>
+        </p:style>
+        <p:txBody>
+          <a:bodyPr rtlCol="0" anchor="ctr"/>
+          <a:lstStyle/>
+          <a:p>
+            <a:pPr algn="ctr"/>
+            <a:endParaRPr lang="en-US"/>
+          </a:p>
+        </p:txBody>
+      </p:sp>
+      <p:grpSp>
+        <p:nvGrpSpPr>
+          <p:cNvPr id="3" name="Group 2">
+            <a:extLst>
+              <a:ext uri="{FF2B5EF4-FFF2-40B4-BE49-F238E27FC236}">
+                <a16:creationId xmlns:a16="http://schemas.microsoft.com/office/drawing/2014/main" id="{0E434AA4-9F46-2D14-1DEB-748DD7B33E00}"/>
+              </a:ext>
+            </a:extLst>
+          </p:cNvPr>
+          <p:cNvGrpSpPr/>
+          <p:nvPr/>
+        </p:nvGrpSpPr>
+        <p:grpSpPr>
+          <a:xfrm>
+            <a:off x="1672285" y="908751"/>
+            <a:ext cx="4885625" cy="4935217"/>
+            <a:chOff x="1672285" y="908751"/>
+            <a:chExt cx="4885625" cy="4935217"/>
+          </a:xfrm>
+        </p:grpSpPr>
+        <p:cxnSp>
+          <p:nvCxnSpPr>
+            <p:cNvPr id="19" name="Straight Connector 18">
+              <a:extLst>
+                <a:ext uri="{FF2B5EF4-FFF2-40B4-BE49-F238E27FC236}">
+                  <a16:creationId xmlns:a16="http://schemas.microsoft.com/office/drawing/2014/main" id="{E892AA2D-0561-BB42-A262-852C02FB3CD1}"/>
+                </a:ext>
+              </a:extLst>
+            </p:cNvPr>
+            <p:cNvCxnSpPr/>
+            <p:nvPr/>
+          </p:nvCxnSpPr>
+          <p:spPr bwMode="auto">
+            <a:xfrm>
+              <a:off x="3993075" y="1628729"/>
+              <a:ext cx="99485" cy="1145048"/>
+            </a:xfrm>
+            <a:prstGeom prst="line">
+              <a:avLst/>
+            </a:prstGeom>
+            <a:noFill/>
+            <a:ln w="317500" cap="rnd" cmpd="sng" algn="ctr">
+              <a:solidFill>
+                <a:schemeClr val="bg1"/>
+              </a:solidFill>
+              <a:prstDash val="solid"/>
+              <a:round/>
+              <a:headEnd type="none" w="med" len="med"/>
+              <a:tailEnd type="none" w="med" len="med"/>
+            </a:ln>
+            <a:effectLst/>
+            <a:scene3d>
+              <a:camera prst="orthographicFront"/>
+              <a:lightRig rig="threePt" dir="t"/>
+            </a:scene3d>
+            <a:sp3d/>
+          </p:spPr>
+        </p:cxnSp>
+        <p:cxnSp>
+          <p:nvCxnSpPr>
+            <p:cNvPr id="20" name="Straight Connector 19">
+              <a:extLst>
+                <a:ext uri="{FF2B5EF4-FFF2-40B4-BE49-F238E27FC236}">
+                  <a16:creationId xmlns:a16="http://schemas.microsoft.com/office/drawing/2014/main" id="{ED68ACEC-C490-6743-A7E2-CC0D6730BA6F}"/>
+                </a:ext>
+              </a:extLst>
+            </p:cNvPr>
+            <p:cNvCxnSpPr/>
+            <p:nvPr/>
+          </p:nvCxnSpPr>
+          <p:spPr bwMode="auto">
+            <a:xfrm>
+              <a:off x="1961154" y="1376996"/>
+              <a:ext cx="1867685" cy="2018145"/>
+            </a:xfrm>
+            <a:prstGeom prst="line">
+              <a:avLst/>
+            </a:prstGeom>
+            <a:noFill/>
+            <a:ln w="317500" cap="rnd" cmpd="sng" algn="ctr">
+              <a:solidFill>
+                <a:schemeClr val="bg1"/>
+              </a:solidFill>
+              <a:prstDash val="solid"/>
+              <a:round/>
+              <a:headEnd type="none" w="med" len="med"/>
+              <a:tailEnd type="none" w="med" len="med"/>
+            </a:ln>
+            <a:effectLst/>
+            <a:scene3d>
+              <a:camera prst="orthographicFront"/>
+              <a:lightRig rig="threePt" dir="t"/>
+            </a:scene3d>
+            <a:sp3d/>
+          </p:spPr>
+        </p:cxnSp>
+        <p:cxnSp>
+          <p:nvCxnSpPr>
+            <p:cNvPr id="21" name="Straight Connector 20">
+              <a:extLst>
+                <a:ext uri="{FF2B5EF4-FFF2-40B4-BE49-F238E27FC236}">
+                  <a16:creationId xmlns:a16="http://schemas.microsoft.com/office/drawing/2014/main" id="{44DEECEF-AE43-F545-AA59-A8C24828F646}"/>
+                </a:ext>
+              </a:extLst>
+            </p:cNvPr>
+            <p:cNvCxnSpPr/>
+            <p:nvPr/>
+          </p:nvCxnSpPr>
+          <p:spPr bwMode="auto">
+            <a:xfrm flipV="1">
+              <a:off x="2262395" y="3497704"/>
+              <a:ext cx="1428733" cy="1788009"/>
+            </a:xfrm>
+            <a:prstGeom prst="line">
+              <a:avLst/>
+            </a:prstGeom>
+            <a:noFill/>
+            <a:ln w="317500" cap="rnd" cmpd="sng" algn="ctr">
+              <a:solidFill>
+                <a:schemeClr val="bg1"/>
+              </a:solidFill>
+              <a:prstDash val="solid"/>
+              <a:round/>
+              <a:headEnd type="none" w="med" len="med"/>
+              <a:tailEnd type="none" w="med" len="med"/>
+            </a:ln>
+            <a:effectLst/>
+            <a:scene3d>
+              <a:camera prst="orthographicFront"/>
+              <a:lightRig rig="threePt" dir="t"/>
+            </a:scene3d>
+            <a:sp3d/>
+          </p:spPr>
+        </p:cxnSp>
+        <p:cxnSp>
+          <p:nvCxnSpPr>
+            <p:cNvPr id="22" name="Straight Connector 21">
+              <a:extLst>
+                <a:ext uri="{FF2B5EF4-FFF2-40B4-BE49-F238E27FC236}">
+                  <a16:creationId xmlns:a16="http://schemas.microsoft.com/office/drawing/2014/main" id="{ECE01757-B23D-0747-9993-9C7429121AC0}"/>
+                </a:ext>
+              </a:extLst>
+            </p:cNvPr>
+            <p:cNvCxnSpPr/>
+            <p:nvPr/>
+          </p:nvCxnSpPr>
+          <p:spPr bwMode="auto">
+            <a:xfrm flipV="1">
+              <a:off x="4525993" y="1775169"/>
+              <a:ext cx="1635303" cy="1593275"/>
+            </a:xfrm>
+            <a:prstGeom prst="line">
+              <a:avLst/>
+            </a:prstGeom>
+            <a:noFill/>
+            <a:ln w="317500" cap="rnd" cmpd="sng" algn="ctr">
+              <a:solidFill>
+                <a:schemeClr val="bg1"/>
+              </a:solidFill>
+              <a:prstDash val="solid"/>
+              <a:round/>
+              <a:headEnd type="none" w="med" len="med"/>
+              <a:tailEnd type="none" w="med" len="med"/>
+            </a:ln>
+            <a:effectLst/>
+            <a:scene3d>
+              <a:camera prst="orthographicFront"/>
+              <a:lightRig rig="threePt" dir="t"/>
+            </a:scene3d>
+            <a:sp3d/>
+          </p:spPr>
+        </p:cxnSp>
+        <p:cxnSp>
+          <p:nvCxnSpPr>
+            <p:cNvPr id="23" name="Straight Connector 22">
+              <a:extLst>
+                <a:ext uri="{FF2B5EF4-FFF2-40B4-BE49-F238E27FC236}">
+                  <a16:creationId xmlns:a16="http://schemas.microsoft.com/office/drawing/2014/main" id="{7AEEF6E2-4D82-F44E-AFC6-7931AB87D94B}"/>
+                </a:ext>
+              </a:extLst>
+            </p:cNvPr>
+            <p:cNvCxnSpPr/>
+            <p:nvPr/>
+          </p:nvCxnSpPr>
+          <p:spPr bwMode="auto">
+            <a:xfrm>
+              <a:off x="4612061" y="3497704"/>
+              <a:ext cx="1204957" cy="1371985"/>
+            </a:xfrm>
+            <a:prstGeom prst="line">
+              <a:avLst/>
+            </a:prstGeom>
+            <a:noFill/>
+            <a:ln w="317500" cap="rnd" cmpd="sng" algn="ctr">
+              <a:solidFill>
+                <a:schemeClr val="bg1"/>
+              </a:solidFill>
+              <a:prstDash val="solid"/>
+              <a:round/>
+              <a:headEnd type="none" w="med" len="med"/>
+              <a:tailEnd type="none" w="med" len="med"/>
+            </a:ln>
+            <a:effectLst/>
+            <a:scene3d>
+              <a:camera prst="orthographicFront"/>
+              <a:lightRig rig="threePt" dir="t"/>
+            </a:scene3d>
+            <a:sp3d/>
+          </p:spPr>
+        </p:cxnSp>
+        <p:sp>
+          <p:nvSpPr>
+            <p:cNvPr id="25" name="Oval 24">
+              <a:extLst>
+                <a:ext uri="{FF2B5EF4-FFF2-40B4-BE49-F238E27FC236}">
+                  <a16:creationId xmlns:a16="http://schemas.microsoft.com/office/drawing/2014/main" id="{682AA4CF-FD63-0C4A-8BB7-9376A7A6CCB5}"/>
+                </a:ext>
+              </a:extLst>
+            </p:cNvPr>
+            <p:cNvSpPr/>
+            <p:nvPr/>
+          </p:nvSpPr>
+          <p:spPr bwMode="auto">
+            <a:xfrm>
+              <a:off x="1912737" y="4616229"/>
+              <a:ext cx="894020" cy="919434"/>
+            </a:xfrm>
+            <a:prstGeom prst="ellipse">
+              <a:avLst/>
+            </a:prstGeom>
+            <a:solidFill>
+              <a:srgbClr val="FFFF00"/>
+            </a:solidFill>
+            <a:ln w="152400" cmpd="sng">
+              <a:solidFill>
+                <a:schemeClr val="bg1"/>
+              </a:solidFill>
+              <a:headEnd type="none" w="med" len="med"/>
+              <a:tailEnd type="none" w="med" len="med"/>
+            </a:ln>
+            <a:effectLst/>
+          </p:spPr>
+          <p:style>
+            <a:lnRef idx="2">
+              <a:schemeClr val="accent3">
+                <a:shade val="50000"/>
+              </a:schemeClr>
+            </a:lnRef>
+            <a:fillRef idx="1">
+              <a:schemeClr val="accent3"/>
+            </a:fillRef>
+            <a:effectRef idx="0">
+              <a:schemeClr val="accent3"/>
+            </a:effectRef>
+            <a:fontRef idx="minor">
+              <a:schemeClr val="lt1"/>
+            </a:fontRef>
+          </p:style>
+          <p:txBody>
+            <a:bodyPr vert="horz" wrap="square" lIns="91440" tIns="45720" rIns="91440" bIns="45720" numCol="1" rtlCol="0" anchor="ctr" anchorCtr="0" compatLnSpc="1">
+              <a:prstTxWarp prst="textNoShape">
+                <a:avLst/>
+              </a:prstTxWarp>
+            </a:bodyPr>
+            <a:lstStyle/>
+            <a:p>
+              <a:pPr marL="0" marR="0" indent="0" algn="r" defTabSz="914400" rtl="0" eaLnBrk="0" fontAlgn="base" latinLnBrk="0" hangingPunct="0">
+                <a:lnSpc>
+                  <a:spcPct val="100000"/>
+                </a:lnSpc>
+                <a:spcBef>
+                  <a:spcPct val="0"/>
+                </a:spcBef>
+                <a:spcAft>
+                  <a:spcPct val="0"/>
+                </a:spcAft>
+                <a:buClrTx/>
+                <a:buSzTx/>
+                <a:buFontTx/>
+                <a:buNone/>
+                <a:tabLst/>
+              </a:pPr>
+              <a:endParaRPr kumimoji="0" lang="en-US" sz="4400" b="1" i="0" u="none" strike="noStrike" cap="none" normalizeH="0" baseline="0" dirty="0">
+                <a:ln>
+                  <a:noFill/>
+                </a:ln>
+                <a:solidFill>
+                  <a:schemeClr val="tx2"/>
+                </a:solidFill>
+                <a:effectLst/>
+                <a:latin typeface="Trebuchet MS" pitchFamily="-65" charset="0"/>
+              </a:endParaRPr>
+            </a:p>
+          </p:txBody>
+        </p:sp>
+        <p:sp>
+          <p:nvSpPr>
+            <p:cNvPr id="26" name="Oval 25">
+              <a:extLst>
+                <a:ext uri="{FF2B5EF4-FFF2-40B4-BE49-F238E27FC236}">
+                  <a16:creationId xmlns:a16="http://schemas.microsoft.com/office/drawing/2014/main" id="{DB3CC57E-24DB-614C-BC69-0BA51A5FE747}"/>
+                </a:ext>
+              </a:extLst>
+            </p:cNvPr>
+            <p:cNvSpPr/>
+            <p:nvPr/>
+          </p:nvSpPr>
+          <p:spPr bwMode="auto">
+            <a:xfrm>
+              <a:off x="1672285" y="1139417"/>
+              <a:ext cx="902205" cy="927853"/>
+            </a:xfrm>
+            <a:prstGeom prst="ellipse">
+              <a:avLst/>
+            </a:prstGeom>
+            <a:solidFill>
+              <a:srgbClr val="FF0000"/>
+            </a:solidFill>
+            <a:ln w="152400" cmpd="sng">
+              <a:solidFill>
+                <a:schemeClr val="bg1"/>
+              </a:solidFill>
+              <a:headEnd type="none" w="med" len="med"/>
+              <a:tailEnd type="none" w="med" len="med"/>
+            </a:ln>
+            <a:effectLst/>
+          </p:spPr>
+          <p:style>
+            <a:lnRef idx="2">
+              <a:schemeClr val="accent3">
+                <a:shade val="50000"/>
+              </a:schemeClr>
+            </a:lnRef>
+            <a:fillRef idx="1">
+              <a:schemeClr val="accent3"/>
+            </a:fillRef>
+            <a:effectRef idx="0">
+              <a:schemeClr val="accent3"/>
+            </a:effectRef>
+            <a:fontRef idx="minor">
+              <a:schemeClr val="lt1"/>
+            </a:fontRef>
+          </p:style>
+          <p:txBody>
+            <a:bodyPr vert="horz" wrap="square" lIns="91440" tIns="45720" rIns="91440" bIns="45720" numCol="1" rtlCol="0" anchor="ctr" anchorCtr="0" compatLnSpc="1">
+              <a:prstTxWarp prst="textNoShape">
+                <a:avLst/>
+              </a:prstTxWarp>
+            </a:bodyPr>
+            <a:lstStyle/>
+            <a:p>
+              <a:pPr marL="0" marR="0" indent="0" algn="r" defTabSz="914400" rtl="0" eaLnBrk="0" fontAlgn="base" latinLnBrk="0" hangingPunct="0">
+                <a:lnSpc>
+                  <a:spcPct val="100000"/>
+                </a:lnSpc>
+                <a:spcBef>
+                  <a:spcPct val="0"/>
+                </a:spcBef>
+                <a:spcAft>
+                  <a:spcPct val="0"/>
+                </a:spcAft>
+                <a:buClrTx/>
+                <a:buSzTx/>
+                <a:buFontTx/>
+                <a:buNone/>
+                <a:tabLst/>
+              </a:pPr>
+              <a:endParaRPr kumimoji="0" lang="en-US" sz="4400" b="1" i="0" u="none" strike="noStrike" cap="none" normalizeH="0" baseline="0">
+                <a:ln>
+                  <a:noFill/>
+                </a:ln>
+                <a:solidFill>
+                  <a:schemeClr val="tx2"/>
+                </a:solidFill>
+                <a:effectLst/>
+                <a:latin typeface="Trebuchet MS" pitchFamily="-65" charset="0"/>
+              </a:endParaRPr>
+            </a:p>
+          </p:txBody>
+        </p:sp>
+        <p:sp>
+          <p:nvSpPr>
+            <p:cNvPr id="27" name="Oval 26">
+              <a:extLst>
+                <a:ext uri="{FF2B5EF4-FFF2-40B4-BE49-F238E27FC236}">
+                  <a16:creationId xmlns:a16="http://schemas.microsoft.com/office/drawing/2014/main" id="{5E432D4C-00DD-DE49-BE7D-90B1D87BC827}"/>
+                </a:ext>
+              </a:extLst>
+            </p:cNvPr>
+            <p:cNvSpPr/>
+            <p:nvPr/>
+          </p:nvSpPr>
+          <p:spPr bwMode="auto">
+            <a:xfrm>
+              <a:off x="5647518" y="1351698"/>
+              <a:ext cx="910392" cy="936272"/>
+            </a:xfrm>
+            <a:prstGeom prst="ellipse">
+              <a:avLst/>
+            </a:prstGeom>
+            <a:solidFill>
+              <a:srgbClr val="3366FF"/>
+            </a:solidFill>
+            <a:ln w="152400" cmpd="sng">
+              <a:solidFill>
+                <a:schemeClr val="bg1"/>
+              </a:solidFill>
+              <a:headEnd type="none" w="med" len="med"/>
+              <a:tailEnd type="none" w="med" len="med"/>
+            </a:ln>
+            <a:effectLst/>
+          </p:spPr>
+          <p:style>
+            <a:lnRef idx="2">
+              <a:schemeClr val="accent3">
+                <a:shade val="50000"/>
+              </a:schemeClr>
+            </a:lnRef>
+            <a:fillRef idx="1">
+              <a:schemeClr val="accent3"/>
+            </a:fillRef>
+            <a:effectRef idx="0">
+              <a:schemeClr val="accent3"/>
+            </a:effectRef>
+            <a:fontRef idx="minor">
+              <a:schemeClr val="lt1"/>
+            </a:fontRef>
+          </p:style>
+          <p:txBody>
+            <a:bodyPr vert="horz" wrap="square" lIns="91440" tIns="45720" rIns="91440" bIns="45720" numCol="1" rtlCol="0" anchor="ctr" anchorCtr="0" compatLnSpc="1">
+              <a:prstTxWarp prst="textNoShape">
+                <a:avLst/>
+              </a:prstTxWarp>
+            </a:bodyPr>
+            <a:lstStyle/>
+            <a:p>
+              <a:pPr marL="0" marR="0" indent="0" algn="r" defTabSz="914400" rtl="0" eaLnBrk="0" fontAlgn="base" latinLnBrk="0" hangingPunct="0">
+                <a:lnSpc>
+                  <a:spcPct val="100000"/>
+                </a:lnSpc>
+                <a:spcBef>
+                  <a:spcPct val="0"/>
+                </a:spcBef>
+                <a:spcAft>
+                  <a:spcPct val="0"/>
+                </a:spcAft>
+                <a:buClrTx/>
+                <a:buSzTx/>
+                <a:buFontTx/>
+                <a:buNone/>
+                <a:tabLst/>
+              </a:pPr>
+              <a:endParaRPr kumimoji="0" lang="en-US" sz="4400" b="1" i="0" u="none" strike="noStrike" cap="none" normalizeH="0" baseline="0">
+                <a:ln>
+                  <a:noFill/>
+                </a:ln>
+                <a:solidFill>
+                  <a:schemeClr val="tx2"/>
+                </a:solidFill>
+                <a:effectLst/>
+                <a:latin typeface="Trebuchet MS" pitchFamily="-65" charset="0"/>
+              </a:endParaRPr>
+            </a:p>
+          </p:txBody>
+        </p:sp>
+        <p:sp>
+          <p:nvSpPr>
+            <p:cNvPr id="28" name="Oval 27">
+              <a:extLst>
+                <a:ext uri="{FF2B5EF4-FFF2-40B4-BE49-F238E27FC236}">
+                  <a16:creationId xmlns:a16="http://schemas.microsoft.com/office/drawing/2014/main" id="{D49715EB-968E-3247-81A6-AA8E1CEBD2B0}"/>
+                </a:ext>
+              </a:extLst>
+            </p:cNvPr>
+            <p:cNvSpPr/>
+            <p:nvPr/>
+          </p:nvSpPr>
+          <p:spPr bwMode="auto">
+            <a:xfrm>
+              <a:off x="5295134" y="4284244"/>
+              <a:ext cx="917268" cy="943344"/>
+            </a:xfrm>
+            <a:prstGeom prst="ellipse">
+              <a:avLst/>
+            </a:prstGeom>
+            <a:solidFill>
+              <a:srgbClr val="008000"/>
+            </a:solidFill>
+            <a:ln w="152400" cmpd="sng">
+              <a:solidFill>
+                <a:schemeClr val="bg1"/>
+              </a:solidFill>
+              <a:headEnd type="none" w="med" len="med"/>
+              <a:tailEnd type="none" w="med" len="med"/>
+            </a:ln>
+            <a:effectLst/>
+          </p:spPr>
+          <p:style>
+            <a:lnRef idx="2">
+              <a:schemeClr val="accent3">
+                <a:shade val="50000"/>
+              </a:schemeClr>
+            </a:lnRef>
+            <a:fillRef idx="1">
+              <a:schemeClr val="accent3"/>
+            </a:fillRef>
+            <a:effectRef idx="0">
+              <a:schemeClr val="accent3"/>
+            </a:effectRef>
+            <a:fontRef idx="minor">
+              <a:schemeClr val="lt1"/>
+            </a:fontRef>
+          </p:style>
+          <p:txBody>
+            <a:bodyPr vert="horz" wrap="square" lIns="91440" tIns="45720" rIns="91440" bIns="45720" numCol="1" rtlCol="0" anchor="ctr" anchorCtr="0" compatLnSpc="1">
+              <a:prstTxWarp prst="textNoShape">
+                <a:avLst/>
+              </a:prstTxWarp>
+            </a:bodyPr>
+            <a:lstStyle/>
+            <a:p>
+              <a:pPr marL="0" marR="0" indent="0" algn="r" defTabSz="914400" rtl="0" eaLnBrk="0" fontAlgn="base" latinLnBrk="0" hangingPunct="0">
+                <a:lnSpc>
+                  <a:spcPct val="100000"/>
+                </a:lnSpc>
+                <a:spcBef>
+                  <a:spcPct val="0"/>
+                </a:spcBef>
+                <a:spcAft>
+                  <a:spcPct val="0"/>
+                </a:spcAft>
+                <a:buClrTx/>
+                <a:buSzTx/>
+                <a:buFontTx/>
+                <a:buNone/>
+                <a:tabLst/>
+              </a:pPr>
+              <a:endParaRPr kumimoji="0" lang="en-US" sz="4400" b="1" i="0" u="none" strike="noStrike" cap="none" normalizeH="0" baseline="0">
+                <a:ln>
+                  <a:noFill/>
+                </a:ln>
+                <a:solidFill>
+                  <a:schemeClr val="tx2"/>
+                </a:solidFill>
+                <a:effectLst/>
+                <a:latin typeface="Trebuchet MS" pitchFamily="-65" charset="0"/>
+              </a:endParaRPr>
+            </a:p>
+          </p:txBody>
+        </p:sp>
+        <p:sp>
+          <p:nvSpPr>
+            <p:cNvPr id="29" name="Oval 28">
+              <a:extLst>
+                <a:ext uri="{FF2B5EF4-FFF2-40B4-BE49-F238E27FC236}">
+                  <a16:creationId xmlns:a16="http://schemas.microsoft.com/office/drawing/2014/main" id="{FAD5B1F2-202D-9445-A16F-4B327E13B05C}"/>
+                </a:ext>
+              </a:extLst>
+            </p:cNvPr>
+            <p:cNvSpPr/>
+            <p:nvPr/>
+          </p:nvSpPr>
+          <p:spPr bwMode="auto">
+            <a:xfrm>
+              <a:off x="3545165" y="908751"/>
+              <a:ext cx="894020" cy="919434"/>
+            </a:xfrm>
+            <a:prstGeom prst="ellipse">
+              <a:avLst/>
+            </a:prstGeom>
+            <a:solidFill>
+              <a:srgbClr val="FF6600"/>
+            </a:solidFill>
+            <a:ln w="152400" cmpd="sng">
+              <a:solidFill>
+                <a:schemeClr val="bg1"/>
+              </a:solidFill>
+              <a:headEnd type="none" w="med" len="med"/>
+              <a:tailEnd type="none" w="med" len="med"/>
+            </a:ln>
+            <a:effectLst/>
+          </p:spPr>
+          <p:style>
+            <a:lnRef idx="2">
+              <a:schemeClr val="accent3">
+                <a:shade val="50000"/>
+              </a:schemeClr>
+            </a:lnRef>
+            <a:fillRef idx="1">
+              <a:schemeClr val="accent3"/>
+            </a:fillRef>
+            <a:effectRef idx="0">
+              <a:schemeClr val="accent3"/>
+            </a:effectRef>
+            <a:fontRef idx="minor">
+              <a:schemeClr val="lt1"/>
+            </a:fontRef>
+          </p:style>
+          <p:txBody>
+            <a:bodyPr vert="horz" wrap="square" lIns="91440" tIns="45720" rIns="91440" bIns="45720" numCol="1" rtlCol="0" anchor="ctr" anchorCtr="0" compatLnSpc="1">
+              <a:prstTxWarp prst="textNoShape">
+                <a:avLst/>
+              </a:prstTxWarp>
+            </a:bodyPr>
+            <a:lstStyle/>
+            <a:p>
+              <a:pPr marL="0" marR="0" indent="0" algn="r" defTabSz="914400" rtl="0" eaLnBrk="0" fontAlgn="base" latinLnBrk="0" hangingPunct="0">
+                <a:lnSpc>
+                  <a:spcPct val="100000"/>
+                </a:lnSpc>
+                <a:spcBef>
+                  <a:spcPct val="0"/>
+                </a:spcBef>
+                <a:spcAft>
+                  <a:spcPct val="0"/>
+                </a:spcAft>
+                <a:buClrTx/>
+                <a:buSzTx/>
+                <a:buFontTx/>
+                <a:buNone/>
+                <a:tabLst/>
+              </a:pPr>
+              <a:endParaRPr kumimoji="0" lang="en-US" sz="4400" b="1" i="0" u="none" strike="noStrike" cap="none" normalizeH="0" baseline="0">
+                <a:ln>
+                  <a:noFill/>
+                </a:ln>
+                <a:solidFill>
+                  <a:schemeClr val="tx2"/>
+                </a:solidFill>
+                <a:effectLst/>
+                <a:latin typeface="Trebuchet MS" pitchFamily="-65" charset="0"/>
+              </a:endParaRPr>
+            </a:p>
+          </p:txBody>
+        </p:sp>
+        <p:sp>
+          <p:nvSpPr>
+            <p:cNvPr id="30" name="Rectangle 29">
+              <a:extLst>
+                <a:ext uri="{FF2B5EF4-FFF2-40B4-BE49-F238E27FC236}">
+                  <a16:creationId xmlns:a16="http://schemas.microsoft.com/office/drawing/2014/main" id="{506D34E3-703B-B44B-B1AE-03B11280C340}"/>
+                </a:ext>
+              </a:extLst>
+            </p:cNvPr>
+            <p:cNvSpPr/>
+            <p:nvPr/>
+          </p:nvSpPr>
+          <p:spPr bwMode="auto">
+            <a:xfrm>
+              <a:off x="3098887" y="2694960"/>
+              <a:ext cx="2099539" cy="1442590"/>
+            </a:xfrm>
+            <a:prstGeom prst="rect">
+              <a:avLst/>
+            </a:prstGeom>
+            <a:solidFill>
+              <a:schemeClr val="bg1"/>
+            </a:solidFill>
+            <a:ln w="254000" cap="flat" cmpd="dbl" algn="ctr">
+              <a:solidFill>
+                <a:schemeClr val="bg1"/>
+              </a:solidFill>
+              <a:prstDash val="solid"/>
+              <a:round/>
+              <a:headEnd type="none" w="med" len="med"/>
+              <a:tailEnd type="none" w="med" len="med"/>
+            </a:ln>
+            <a:effectLst/>
+            <a:scene3d>
+              <a:camera prst="orthographicFront"/>
+              <a:lightRig rig="threePt" dir="t"/>
+            </a:scene3d>
+            <a:sp3d/>
+          </p:spPr>
+          <p:txBody>
+            <a:bodyPr vert="horz" wrap="square" lIns="91440" tIns="45720" rIns="91440" bIns="45720" numCol="1" rtlCol="0" anchor="ctr" anchorCtr="0" compatLnSpc="1">
+              <a:prstTxWarp prst="textNoShape">
+                <a:avLst/>
+              </a:prstTxWarp>
+            </a:bodyPr>
+            <a:lstStyle/>
+            <a:p>
+              <a:pPr marL="0" marR="0" indent="0" algn="r" defTabSz="914400" rtl="0" eaLnBrk="0" fontAlgn="base" latinLnBrk="0" hangingPunct="0">
+                <a:lnSpc>
+                  <a:spcPct val="100000"/>
+                </a:lnSpc>
+                <a:spcBef>
+                  <a:spcPct val="0"/>
+                </a:spcBef>
+                <a:spcAft>
+                  <a:spcPct val="0"/>
+                </a:spcAft>
+                <a:buClrTx/>
+                <a:buSzTx/>
+                <a:buFontTx/>
+                <a:buNone/>
+                <a:tabLst/>
+              </a:pPr>
+              <a:endParaRPr kumimoji="0" lang="en-US" sz="4400" b="1" i="0" u="none" strike="noStrike" cap="none" normalizeH="0" baseline="0">
+                <a:ln>
+                  <a:noFill/>
+                </a:ln>
+                <a:solidFill>
+                  <a:schemeClr val="tx2"/>
+                </a:solidFill>
+                <a:effectLst/>
+                <a:latin typeface="Trebuchet MS" pitchFamily="-65" charset="0"/>
+              </a:endParaRPr>
+            </a:p>
+          </p:txBody>
+        </p:sp>
+        <p:sp>
+          <p:nvSpPr>
+            <p:cNvPr id="31" name="Rectangle 30">
+              <a:extLst>
+                <a:ext uri="{FF2B5EF4-FFF2-40B4-BE49-F238E27FC236}">
+                  <a16:creationId xmlns:a16="http://schemas.microsoft.com/office/drawing/2014/main" id="{25A300BF-948B-474B-8203-9252AB58A43D}"/>
+                </a:ext>
+              </a:extLst>
+            </p:cNvPr>
+            <p:cNvSpPr/>
+            <p:nvPr/>
+          </p:nvSpPr>
+          <p:spPr bwMode="auto">
+            <a:xfrm>
+              <a:off x="3218537" y="2785724"/>
+              <a:ext cx="1878307" cy="1265766"/>
+            </a:xfrm>
+            <a:prstGeom prst="rect">
+              <a:avLst/>
+            </a:prstGeom>
+            <a:solidFill>
+              <a:schemeClr val="tx1"/>
+            </a:solidFill>
+            <a:ln w="317500" cap="flat" cmpd="sng" algn="ctr">
+              <a:solidFill>
+                <a:schemeClr val="bg1"/>
+              </a:solidFill>
+              <a:prstDash val="solid"/>
+              <a:miter lim="800000"/>
+              <a:headEnd type="none" w="med" len="med"/>
+              <a:tailEnd type="none" w="med" len="med"/>
+            </a:ln>
+            <a:effectLst/>
+            <a:scene3d>
+              <a:camera prst="orthographicFront"/>
+              <a:lightRig rig="threePt" dir="t"/>
+            </a:scene3d>
+            <a:sp3d/>
+          </p:spPr>
+          <p:txBody>
+            <a:bodyPr vert="horz" wrap="square" lIns="91440" tIns="45720" rIns="91440" bIns="45720" numCol="1" rtlCol="0" anchor="ctr" anchorCtr="0" compatLnSpc="1">
+              <a:prstTxWarp prst="textNoShape">
+                <a:avLst/>
+              </a:prstTxWarp>
+            </a:bodyPr>
+            <a:lstStyle/>
+            <a:p>
+              <a:pPr marL="0" marR="0" indent="0" algn="r" defTabSz="914400" rtl="0" eaLnBrk="0" fontAlgn="base" latinLnBrk="0" hangingPunct="0">
+                <a:lnSpc>
+                  <a:spcPct val="100000"/>
+                </a:lnSpc>
+                <a:spcBef>
+                  <a:spcPct val="0"/>
+                </a:spcBef>
+                <a:spcAft>
+                  <a:spcPct val="0"/>
+                </a:spcAft>
+                <a:buClrTx/>
+                <a:buSzTx/>
+                <a:buFontTx/>
+                <a:buNone/>
+                <a:tabLst/>
+              </a:pPr>
+              <a:endParaRPr kumimoji="0" lang="en-US" sz="4400" b="1" i="0" u="none" strike="noStrike" cap="none" normalizeH="0" baseline="0">
+                <a:ln>
+                  <a:noFill/>
+                </a:ln>
+                <a:solidFill>
+                  <a:schemeClr val="tx2"/>
+                </a:solidFill>
+                <a:effectLst/>
+                <a:latin typeface="Trebuchet MS" pitchFamily="-65" charset="0"/>
+              </a:endParaRPr>
+            </a:p>
+          </p:txBody>
+        </p:sp>
+        <p:cxnSp>
+          <p:nvCxnSpPr>
+            <p:cNvPr id="32" name="Straight Connector 31">
+              <a:extLst>
+                <a:ext uri="{FF2B5EF4-FFF2-40B4-BE49-F238E27FC236}">
+                  <a16:creationId xmlns:a16="http://schemas.microsoft.com/office/drawing/2014/main" id="{75C105D7-730D-BD45-8D5D-7E2DF06C6C9E}"/>
+                </a:ext>
+              </a:extLst>
+            </p:cNvPr>
+            <p:cNvCxnSpPr>
+              <a:cxnSpLocks/>
+            </p:cNvCxnSpPr>
+            <p:nvPr/>
+          </p:nvCxnSpPr>
+          <p:spPr bwMode="auto">
+            <a:xfrm flipH="1">
+              <a:off x="3713667" y="4149497"/>
+              <a:ext cx="456362" cy="1176098"/>
+            </a:xfrm>
+            <a:prstGeom prst="line">
+              <a:avLst/>
+            </a:prstGeom>
+            <a:noFill/>
+            <a:ln w="317500" cap="rnd" cmpd="sng" algn="ctr">
+              <a:solidFill>
+                <a:schemeClr val="bg1"/>
+              </a:solidFill>
+              <a:prstDash val="solid"/>
+              <a:round/>
+              <a:headEnd type="none" w="med" len="med"/>
+              <a:tailEnd type="none" w="med" len="med"/>
+            </a:ln>
+            <a:effectLst/>
+            <a:scene3d>
+              <a:camera prst="orthographicFront"/>
+              <a:lightRig rig="threePt" dir="t"/>
+            </a:scene3d>
+            <a:sp3d/>
+          </p:spPr>
+        </p:cxnSp>
+        <p:sp>
+          <p:nvSpPr>
+            <p:cNvPr id="33" name="Oval 32">
+              <a:extLst>
+                <a:ext uri="{FF2B5EF4-FFF2-40B4-BE49-F238E27FC236}">
+                  <a16:creationId xmlns:a16="http://schemas.microsoft.com/office/drawing/2014/main" id="{F5815695-52FD-6244-8B97-51EF917D00E7}"/>
+                </a:ext>
+              </a:extLst>
+            </p:cNvPr>
+            <p:cNvSpPr/>
+            <p:nvPr/>
+          </p:nvSpPr>
+          <p:spPr bwMode="auto">
+            <a:xfrm>
+              <a:off x="3335366" y="4916115"/>
+              <a:ext cx="902205" cy="927853"/>
+            </a:xfrm>
+            <a:prstGeom prst="ellipse">
+              <a:avLst/>
+            </a:prstGeom>
+            <a:solidFill>
+              <a:srgbClr val="7030A0"/>
+            </a:solidFill>
+            <a:ln w="152400" cmpd="sng">
+              <a:solidFill>
+                <a:schemeClr val="bg1"/>
+              </a:solidFill>
+              <a:headEnd type="none" w="med" len="med"/>
+              <a:tailEnd type="none" w="med" len="med"/>
+            </a:ln>
+            <a:effectLst/>
+          </p:spPr>
+          <p:style>
+            <a:lnRef idx="2">
+              <a:schemeClr val="accent3">
+                <a:shade val="50000"/>
+              </a:schemeClr>
+            </a:lnRef>
+            <a:fillRef idx="1">
+              <a:schemeClr val="accent3"/>
+            </a:fillRef>
+            <a:effectRef idx="0">
+              <a:schemeClr val="accent3"/>
+            </a:effectRef>
+            <a:fontRef idx="minor">
+              <a:schemeClr val="lt1"/>
+            </a:fontRef>
+          </p:style>
+          <p:txBody>
+            <a:bodyPr vert="horz" wrap="square" lIns="91440" tIns="45720" rIns="91440" bIns="45720" numCol="1" rtlCol="0" anchor="ctr" anchorCtr="0" compatLnSpc="1">
+              <a:prstTxWarp prst="textNoShape">
+                <a:avLst/>
+              </a:prstTxWarp>
+            </a:bodyPr>
+            <a:lstStyle/>
+            <a:p>
+              <a:pPr marL="0" marR="0" indent="0" algn="r" defTabSz="914400" rtl="0" eaLnBrk="0" fontAlgn="base" latinLnBrk="0" hangingPunct="0">
+                <a:lnSpc>
+                  <a:spcPct val="100000"/>
+                </a:lnSpc>
+                <a:spcBef>
+                  <a:spcPct val="0"/>
+                </a:spcBef>
+                <a:spcAft>
+                  <a:spcPct val="0"/>
+                </a:spcAft>
+                <a:buClrTx/>
+                <a:buSzTx/>
+                <a:buFontTx/>
+                <a:buNone/>
+                <a:tabLst/>
+              </a:pPr>
+              <a:endParaRPr kumimoji="0" lang="en-US" sz="4400" b="1" i="0" u="none" strike="noStrike" cap="none" normalizeH="0" baseline="0">
+                <a:ln>
+                  <a:noFill/>
+                </a:ln>
+                <a:solidFill>
+                  <a:schemeClr val="tx2"/>
+                </a:solidFill>
+                <a:effectLst/>
+                <a:latin typeface="Trebuchet MS" pitchFamily="-65" charset="0"/>
+              </a:endParaRPr>
+            </a:p>
+          </p:txBody>
+        </p:sp>
+      </p:grpSp>
+    </p:spTree>
+    <p:extLst>
+      <p:ext uri="{BB962C8B-B14F-4D97-AF65-F5344CB8AC3E}">
+        <p14:creationId xmlns:p14="http://schemas.microsoft.com/office/powerpoint/2010/main" val="3592792758"/>
+      </p:ext>
+    </p:extLst>
+  </p:cSld>
+  <p:clrMapOvr>
+    <a:masterClrMapping/>
+  </p:clrMapOvr>
+</p:sld>
+</file>
+
+<file path=ppt/slides/slide3.xml><?xml version="1.0" encoding="utf-8"?>
+<p:sld xmlns:a="http://schemas.openxmlformats.org/drawingml/2006/main" xmlns:r="http://schemas.openxmlformats.org/officeDocument/2006/relationships" xmlns:p="http://schemas.openxmlformats.org/presentationml/2006/main">
+  <p:cSld>
+    <p:spTree>
+      <p:nvGrpSpPr>
+        <p:cNvPr id="1" name=""/>
+        <p:cNvGrpSpPr/>
+        <p:nvPr/>
+      </p:nvGrpSpPr>
+      <p:grpSpPr>
+        <a:xfrm>
+          <a:off x="0" y="0"/>
+          <a:ext cx="0" cy="0"/>
+          <a:chOff x="0" y="0"/>
+          <a:chExt cx="0" cy="0"/>
+        </a:xfrm>
+      </p:grpSpPr>
       <p:grpSp>
         <p:nvGrpSpPr>
           <p:cNvPr id="26" name="Group 25">
@@ -4308,7 +5296,7 @@
 </p:sld>
 </file>
 
-<file path=ppt/slides/slide3.xml><?xml version="1.0" encoding="utf-8"?>
+<file path=ppt/slides/slide4.xml><?xml version="1.0" encoding="utf-8"?>
 <p:sld xmlns:a="http://schemas.openxmlformats.org/drawingml/2006/main" xmlns:r="http://schemas.openxmlformats.org/officeDocument/2006/relationships" xmlns:p="http://schemas.openxmlformats.org/presentationml/2006/main">
   <p:cSld>
     <p:spTree>

</xml_diff>

<commit_message>
support for rich Newick
</commit_message>
<xml_diff>
--- a/artwork/SplitsTree6-icon.pptx
+++ b/artwork/SplitsTree6-icon.pptx
@@ -305,7 +305,7 @@
           <a:p>
             <a:fld id="{1C8BF6C4-08AF-5841-8054-716EACEF0073}" type="datetimeFigureOut">
               <a:rPr lang="en-US" smtClean="0"/>
-              <a:t>5/6/22</a:t>
+              <a:t>7/2/22</a:t>
             </a:fld>
             <a:endParaRPr lang="en-US"/>
           </a:p>
@@ -473,7 +473,7 @@
           <a:p>
             <a:fld id="{1C8BF6C4-08AF-5841-8054-716EACEF0073}" type="datetimeFigureOut">
               <a:rPr lang="en-US" smtClean="0"/>
-              <a:t>5/6/22</a:t>
+              <a:t>7/2/22</a:t>
             </a:fld>
             <a:endParaRPr lang="en-US"/>
           </a:p>
@@ -651,7 +651,7 @@
           <a:p>
             <a:fld id="{1C8BF6C4-08AF-5841-8054-716EACEF0073}" type="datetimeFigureOut">
               <a:rPr lang="en-US" smtClean="0"/>
-              <a:t>5/6/22</a:t>
+              <a:t>7/2/22</a:t>
             </a:fld>
             <a:endParaRPr lang="en-US"/>
           </a:p>
@@ -819,7 +819,7 @@
           <a:p>
             <a:fld id="{1C8BF6C4-08AF-5841-8054-716EACEF0073}" type="datetimeFigureOut">
               <a:rPr lang="en-US" smtClean="0"/>
-              <a:t>5/6/22</a:t>
+              <a:t>7/2/22</a:t>
             </a:fld>
             <a:endParaRPr lang="en-US"/>
           </a:p>
@@ -1064,7 +1064,7 @@
           <a:p>
             <a:fld id="{1C8BF6C4-08AF-5841-8054-716EACEF0073}" type="datetimeFigureOut">
               <a:rPr lang="en-US" smtClean="0"/>
-              <a:t>5/6/22</a:t>
+              <a:t>7/2/22</a:t>
             </a:fld>
             <a:endParaRPr lang="en-US"/>
           </a:p>
@@ -1349,7 +1349,7 @@
           <a:p>
             <a:fld id="{1C8BF6C4-08AF-5841-8054-716EACEF0073}" type="datetimeFigureOut">
               <a:rPr lang="en-US" smtClean="0"/>
-              <a:t>5/6/22</a:t>
+              <a:t>7/2/22</a:t>
             </a:fld>
             <a:endParaRPr lang="en-US"/>
           </a:p>
@@ -1768,7 +1768,7 @@
           <a:p>
             <a:fld id="{1C8BF6C4-08AF-5841-8054-716EACEF0073}" type="datetimeFigureOut">
               <a:rPr lang="en-US" smtClean="0"/>
-              <a:t>5/6/22</a:t>
+              <a:t>7/2/22</a:t>
             </a:fld>
             <a:endParaRPr lang="en-US"/>
           </a:p>
@@ -1885,7 +1885,7 @@
           <a:p>
             <a:fld id="{1C8BF6C4-08AF-5841-8054-716EACEF0073}" type="datetimeFigureOut">
               <a:rPr lang="en-US" smtClean="0"/>
-              <a:t>5/6/22</a:t>
+              <a:t>7/2/22</a:t>
             </a:fld>
             <a:endParaRPr lang="en-US"/>
           </a:p>
@@ -1980,7 +1980,7 @@
           <a:p>
             <a:fld id="{1C8BF6C4-08AF-5841-8054-716EACEF0073}" type="datetimeFigureOut">
               <a:rPr lang="en-US" smtClean="0"/>
-              <a:t>5/6/22</a:t>
+              <a:t>7/2/22</a:t>
             </a:fld>
             <a:endParaRPr lang="en-US"/>
           </a:p>
@@ -2255,7 +2255,7 @@
           <a:p>
             <a:fld id="{1C8BF6C4-08AF-5841-8054-716EACEF0073}" type="datetimeFigureOut">
               <a:rPr lang="en-US" smtClean="0"/>
-              <a:t>5/6/22</a:t>
+              <a:t>7/2/22</a:t>
             </a:fld>
             <a:endParaRPr lang="en-US"/>
           </a:p>
@@ -2507,7 +2507,7 @@
           <a:p>
             <a:fld id="{1C8BF6C4-08AF-5841-8054-716EACEF0073}" type="datetimeFigureOut">
               <a:rPr lang="en-US" smtClean="0"/>
-              <a:t>5/6/22</a:t>
+              <a:t>7/2/22</a:t>
             </a:fld>
             <a:endParaRPr lang="en-US"/>
           </a:p>
@@ -2718,7 +2718,7 @@
           <a:p>
             <a:fld id="{1C8BF6C4-08AF-5841-8054-716EACEF0073}" type="datetimeFigureOut">
               <a:rPr lang="en-US" smtClean="0"/>
-              <a:t>5/6/22</a:t>
+              <a:t>7/2/22</a:t>
             </a:fld>
             <a:endParaRPr lang="en-US"/>
           </a:p>
@@ -5205,7 +5205,7 @@
                 <a:latin typeface="Eurostile"/>
                 <a:cs typeface="Eurostile"/>
               </a:rPr>
-              <a:t>&amp; David J. Bryant</a:t>
+              <a:t>&amp; David Bryant</a:t>
             </a:r>
           </a:p>
           <a:p>

</xml_diff>

<commit_message>
more work on mobile UI
</commit_message>
<xml_diff>
--- a/artwork/SplitsTree6-icon.pptx
+++ b/artwork/SplitsTree6-icon.pptx
@@ -9,6 +9,7 @@
     <p:sldId id="259" r:id="rId3"/>
     <p:sldId id="257" r:id="rId4"/>
     <p:sldId id="258" r:id="rId5"/>
+    <p:sldId id="260" r:id="rId6"/>
   </p:sldIdLst>
   <p:sldSz cx="9144000" cy="6858000" type="screen4x3"/>
   <p:notesSz cx="6858000" cy="9144000"/>
@@ -305,7 +306,7 @@
           <a:p>
             <a:fld id="{1C8BF6C4-08AF-5841-8054-716EACEF0073}" type="datetimeFigureOut">
               <a:rPr lang="en-US" smtClean="0"/>
-              <a:t>1/2/23</a:t>
+              <a:t>1/2/24</a:t>
             </a:fld>
             <a:endParaRPr lang="en-US"/>
           </a:p>
@@ -473,7 +474,7 @@
           <a:p>
             <a:fld id="{1C8BF6C4-08AF-5841-8054-716EACEF0073}" type="datetimeFigureOut">
               <a:rPr lang="en-US" smtClean="0"/>
-              <a:t>1/2/23</a:t>
+              <a:t>1/2/24</a:t>
             </a:fld>
             <a:endParaRPr lang="en-US"/>
           </a:p>
@@ -651,7 +652,7 @@
           <a:p>
             <a:fld id="{1C8BF6C4-08AF-5841-8054-716EACEF0073}" type="datetimeFigureOut">
               <a:rPr lang="en-US" smtClean="0"/>
-              <a:t>1/2/23</a:t>
+              <a:t>1/2/24</a:t>
             </a:fld>
             <a:endParaRPr lang="en-US"/>
           </a:p>
@@ -819,7 +820,7 @@
           <a:p>
             <a:fld id="{1C8BF6C4-08AF-5841-8054-716EACEF0073}" type="datetimeFigureOut">
               <a:rPr lang="en-US" smtClean="0"/>
-              <a:t>1/2/23</a:t>
+              <a:t>1/2/24</a:t>
             </a:fld>
             <a:endParaRPr lang="en-US"/>
           </a:p>
@@ -1064,7 +1065,7 @@
           <a:p>
             <a:fld id="{1C8BF6C4-08AF-5841-8054-716EACEF0073}" type="datetimeFigureOut">
               <a:rPr lang="en-US" smtClean="0"/>
-              <a:t>1/2/23</a:t>
+              <a:t>1/2/24</a:t>
             </a:fld>
             <a:endParaRPr lang="en-US"/>
           </a:p>
@@ -1349,7 +1350,7 @@
           <a:p>
             <a:fld id="{1C8BF6C4-08AF-5841-8054-716EACEF0073}" type="datetimeFigureOut">
               <a:rPr lang="en-US" smtClean="0"/>
-              <a:t>1/2/23</a:t>
+              <a:t>1/2/24</a:t>
             </a:fld>
             <a:endParaRPr lang="en-US"/>
           </a:p>
@@ -1768,7 +1769,7 @@
           <a:p>
             <a:fld id="{1C8BF6C4-08AF-5841-8054-716EACEF0073}" type="datetimeFigureOut">
               <a:rPr lang="en-US" smtClean="0"/>
-              <a:t>1/2/23</a:t>
+              <a:t>1/2/24</a:t>
             </a:fld>
             <a:endParaRPr lang="en-US"/>
           </a:p>
@@ -1885,7 +1886,7 @@
           <a:p>
             <a:fld id="{1C8BF6C4-08AF-5841-8054-716EACEF0073}" type="datetimeFigureOut">
               <a:rPr lang="en-US" smtClean="0"/>
-              <a:t>1/2/23</a:t>
+              <a:t>1/2/24</a:t>
             </a:fld>
             <a:endParaRPr lang="en-US"/>
           </a:p>
@@ -1980,7 +1981,7 @@
           <a:p>
             <a:fld id="{1C8BF6C4-08AF-5841-8054-716EACEF0073}" type="datetimeFigureOut">
               <a:rPr lang="en-US" smtClean="0"/>
-              <a:t>1/2/23</a:t>
+              <a:t>1/2/24</a:t>
             </a:fld>
             <a:endParaRPr lang="en-US"/>
           </a:p>
@@ -2255,7 +2256,7 @@
           <a:p>
             <a:fld id="{1C8BF6C4-08AF-5841-8054-716EACEF0073}" type="datetimeFigureOut">
               <a:rPr lang="en-US" smtClean="0"/>
-              <a:t>1/2/23</a:t>
+              <a:t>1/2/24</a:t>
             </a:fld>
             <a:endParaRPr lang="en-US"/>
           </a:p>
@@ -2507,7 +2508,7 @@
           <a:p>
             <a:fld id="{1C8BF6C4-08AF-5841-8054-716EACEF0073}" type="datetimeFigureOut">
               <a:rPr lang="en-US" smtClean="0"/>
-              <a:t>1/2/23</a:t>
+              <a:t>1/2/24</a:t>
             </a:fld>
             <a:endParaRPr lang="en-US"/>
           </a:p>
@@ -2718,7 +2719,7 @@
           <a:p>
             <a:fld id="{1C8BF6C4-08AF-5841-8054-716EACEF0073}" type="datetimeFigureOut">
               <a:rPr lang="en-US" smtClean="0"/>
-              <a:t>1/2/23</a:t>
+              <a:t>1/2/24</a:t>
             </a:fld>
             <a:endParaRPr lang="en-US"/>
           </a:p>
@@ -5374,6 +5375,138 @@
 </p:sld>
 </file>
 
+<file path=ppt/slides/slide5.xml><?xml version="1.0" encoding="utf-8"?>
+<p:sld xmlns:a="http://schemas.openxmlformats.org/drawingml/2006/main" xmlns:r="http://schemas.openxmlformats.org/officeDocument/2006/relationships" xmlns:p="http://schemas.openxmlformats.org/presentationml/2006/main">
+  <p:cSld>
+    <p:spTree>
+      <p:nvGrpSpPr>
+        <p:cNvPr id="1" name=""/>
+        <p:cNvGrpSpPr/>
+        <p:nvPr/>
+      </p:nvGrpSpPr>
+      <p:grpSpPr>
+        <a:xfrm>
+          <a:off x="0" y="0"/>
+          <a:ext cx="0" cy="0"/>
+          <a:chOff x="0" y="0"/>
+          <a:chExt cx="0" cy="0"/>
+        </a:xfrm>
+      </p:grpSpPr>
+      <p:grpSp>
+        <p:nvGrpSpPr>
+          <p:cNvPr id="3" name="Group 2">
+            <a:extLst>
+              <a:ext uri="{FF2B5EF4-FFF2-40B4-BE49-F238E27FC236}">
+                <a16:creationId xmlns:a16="http://schemas.microsoft.com/office/drawing/2014/main" id="{3C69E49C-E150-807C-B312-B8AF1C08CC09}"/>
+              </a:ext>
+            </a:extLst>
+          </p:cNvPr>
+          <p:cNvGrpSpPr/>
+          <p:nvPr/>
+        </p:nvGrpSpPr>
+        <p:grpSpPr>
+          <a:xfrm>
+            <a:off x="1027135" y="479121"/>
+            <a:ext cx="5314168" cy="5314168"/>
+            <a:chOff x="1027135" y="479121"/>
+            <a:chExt cx="5314168" cy="5314168"/>
+          </a:xfrm>
+        </p:grpSpPr>
+        <p:sp>
+          <p:nvSpPr>
+            <p:cNvPr id="2" name="Rectangle 1">
+              <a:extLst>
+                <a:ext uri="{FF2B5EF4-FFF2-40B4-BE49-F238E27FC236}">
+                  <a16:creationId xmlns:a16="http://schemas.microsoft.com/office/drawing/2014/main" id="{7E63A039-94D0-B361-BC01-7AA6BDDC98F4}"/>
+                </a:ext>
+              </a:extLst>
+            </p:cNvPr>
+            <p:cNvSpPr/>
+            <p:nvPr/>
+          </p:nvSpPr>
+          <p:spPr>
+            <a:xfrm>
+              <a:off x="1027135" y="479121"/>
+              <a:ext cx="5314168" cy="5314168"/>
+            </a:xfrm>
+            <a:prstGeom prst="rect">
+              <a:avLst/>
+            </a:prstGeom>
+            <a:solidFill>
+              <a:schemeClr val="bg1"/>
+            </a:solidFill>
+            <a:ln>
+              <a:noFill/>
+            </a:ln>
+            <a:effectLst/>
+          </p:spPr>
+          <p:style>
+            <a:lnRef idx="1">
+              <a:schemeClr val="accent1"/>
+            </a:lnRef>
+            <a:fillRef idx="3">
+              <a:schemeClr val="accent1"/>
+            </a:fillRef>
+            <a:effectRef idx="2">
+              <a:schemeClr val="accent1"/>
+            </a:effectRef>
+            <a:fontRef idx="minor">
+              <a:schemeClr val="lt1"/>
+            </a:fontRef>
+          </p:style>
+          <p:txBody>
+            <a:bodyPr rtlCol="0" anchor="ctr"/>
+            <a:lstStyle/>
+            <a:p>
+              <a:pPr algn="ctr"/>
+              <a:endParaRPr lang="en-US" dirty="0"/>
+            </a:p>
+          </p:txBody>
+        </p:sp>
+        <p:pic>
+          <p:nvPicPr>
+            <p:cNvPr id="5" name="Picture 4" descr="Icon&#10;&#10;Description automatically generated">
+              <a:extLst>
+                <a:ext uri="{FF2B5EF4-FFF2-40B4-BE49-F238E27FC236}">
+                  <a16:creationId xmlns:a16="http://schemas.microsoft.com/office/drawing/2014/main" id="{B5EA3ACF-1A3E-EA48-82BC-13152343FBD3}"/>
+                </a:ext>
+              </a:extLst>
+            </p:cNvPr>
+            <p:cNvPicPr>
+              <a:picLocks noChangeAspect="1"/>
+            </p:cNvPicPr>
+            <p:nvPr/>
+          </p:nvPicPr>
+          <p:blipFill>
+            <a:blip r:embed="rId2"/>
+            <a:stretch>
+              <a:fillRect/>
+            </a:stretch>
+          </p:blipFill>
+          <p:spPr>
+            <a:xfrm>
+              <a:off x="1169619" y="589855"/>
+              <a:ext cx="5029200" cy="5092700"/>
+            </a:xfrm>
+            <a:prstGeom prst="rect">
+              <a:avLst/>
+            </a:prstGeom>
+          </p:spPr>
+        </p:pic>
+      </p:grpSp>
+    </p:spTree>
+    <p:extLst>
+      <p:ext uri="{BB962C8B-B14F-4D97-AF65-F5344CB8AC3E}">
+        <p14:creationId xmlns:p14="http://schemas.microsoft.com/office/powerpoint/2010/main" val="2815971632"/>
+      </p:ext>
+    </p:extLst>
+  </p:cSld>
+  <p:clrMapOvr>
+    <a:masterClrMapping/>
+  </p:clrMapOvr>
+</p:sld>
+</file>
+
 <file path=ppt/theme/theme1.xml><?xml version="1.0" encoding="utf-8"?>
 <a:theme xmlns:a="http://schemas.openxmlformats.org/drawingml/2006/main" name="Office Theme">
   <a:themeElements>

</xml_diff>